<commit_message>
Synplot graphs and Fisher test was updated for 213 genomes
</commit_message>
<xml_diff>
--- a/images/aftr_synplot_subsets.pptx
+++ b/images/aftr_synplot_subsets.pptx
@@ -10,14 +10,14 @@
   <p:sldIdLst>
     <p:sldId id="256" r:id="rId2"/>
   </p:sldIdLst>
-  <p:sldSz cx="6858000" cy="2743200"/>
+  <p:sldSz cx="6480175" cy="1800225"/>
   <p:notesSz cx="6858000" cy="9144000"/>
   <p:defaultTextStyle>
     <a:defPPr>
       <a:defRPr lang="en-US"/>
     </a:defPPr>
-    <a:lvl1pPr marL="0" algn="l" defTabSz="229962" rtl="0" eaLnBrk="1" latinLnBrk="0" hangingPunct="1">
-      <a:defRPr sz="951" kern="1200">
+    <a:lvl1pPr marL="0" algn="l" defTabSz="181095" rtl="0" eaLnBrk="1" latinLnBrk="0" hangingPunct="1">
+      <a:defRPr sz="749" kern="1200">
         <a:solidFill>
           <a:schemeClr val="tx1"/>
         </a:solidFill>
@@ -26,8 +26,8 @@
         <a:cs typeface="+mn-cs"/>
       </a:defRPr>
     </a:lvl1pPr>
-    <a:lvl2pPr marL="229962" algn="l" defTabSz="229962" rtl="0" eaLnBrk="1" latinLnBrk="0" hangingPunct="1">
-      <a:defRPr sz="951" kern="1200">
+    <a:lvl2pPr marL="181095" algn="l" defTabSz="181095" rtl="0" eaLnBrk="1" latinLnBrk="0" hangingPunct="1">
+      <a:defRPr sz="749" kern="1200">
         <a:solidFill>
           <a:schemeClr val="tx1"/>
         </a:solidFill>
@@ -36,8 +36,8 @@
         <a:cs typeface="+mn-cs"/>
       </a:defRPr>
     </a:lvl2pPr>
-    <a:lvl3pPr marL="459927" algn="l" defTabSz="229962" rtl="0" eaLnBrk="1" latinLnBrk="0" hangingPunct="1">
-      <a:defRPr sz="951" kern="1200">
+    <a:lvl3pPr marL="362193" algn="l" defTabSz="181095" rtl="0" eaLnBrk="1" latinLnBrk="0" hangingPunct="1">
+      <a:defRPr sz="749" kern="1200">
         <a:solidFill>
           <a:schemeClr val="tx1"/>
         </a:solidFill>
@@ -46,8 +46,8 @@
         <a:cs typeface="+mn-cs"/>
       </a:defRPr>
     </a:lvl3pPr>
-    <a:lvl4pPr marL="689890" algn="l" defTabSz="229962" rtl="0" eaLnBrk="1" latinLnBrk="0" hangingPunct="1">
-      <a:defRPr sz="951" kern="1200">
+    <a:lvl4pPr marL="543288" algn="l" defTabSz="181095" rtl="0" eaLnBrk="1" latinLnBrk="0" hangingPunct="1">
+      <a:defRPr sz="749" kern="1200">
         <a:solidFill>
           <a:schemeClr val="tx1"/>
         </a:solidFill>
@@ -56,8 +56,8 @@
         <a:cs typeface="+mn-cs"/>
       </a:defRPr>
     </a:lvl4pPr>
-    <a:lvl5pPr marL="919852" algn="l" defTabSz="229962" rtl="0" eaLnBrk="1" latinLnBrk="0" hangingPunct="1">
-      <a:defRPr sz="951" kern="1200">
+    <a:lvl5pPr marL="724383" algn="l" defTabSz="181095" rtl="0" eaLnBrk="1" latinLnBrk="0" hangingPunct="1">
+      <a:defRPr sz="749" kern="1200">
         <a:solidFill>
           <a:schemeClr val="tx1"/>
         </a:solidFill>
@@ -66,8 +66,8 @@
         <a:cs typeface="+mn-cs"/>
       </a:defRPr>
     </a:lvl5pPr>
-    <a:lvl6pPr marL="1149818" algn="l" defTabSz="229962" rtl="0" eaLnBrk="1" latinLnBrk="0" hangingPunct="1">
-      <a:defRPr sz="951" kern="1200">
+    <a:lvl6pPr marL="905482" algn="l" defTabSz="181095" rtl="0" eaLnBrk="1" latinLnBrk="0" hangingPunct="1">
+      <a:defRPr sz="749" kern="1200">
         <a:solidFill>
           <a:schemeClr val="tx1"/>
         </a:solidFill>
@@ -76,8 +76,8 @@
         <a:cs typeface="+mn-cs"/>
       </a:defRPr>
     </a:lvl6pPr>
-    <a:lvl7pPr marL="1379780" algn="l" defTabSz="229962" rtl="0" eaLnBrk="1" latinLnBrk="0" hangingPunct="1">
-      <a:defRPr sz="951" kern="1200">
+    <a:lvl7pPr marL="1086577" algn="l" defTabSz="181095" rtl="0" eaLnBrk="1" latinLnBrk="0" hangingPunct="1">
+      <a:defRPr sz="749" kern="1200">
         <a:solidFill>
           <a:schemeClr val="tx1"/>
         </a:solidFill>
@@ -86,8 +86,8 @@
         <a:cs typeface="+mn-cs"/>
       </a:defRPr>
     </a:lvl7pPr>
-    <a:lvl8pPr marL="1609746" algn="l" defTabSz="229962" rtl="0" eaLnBrk="1" latinLnBrk="0" hangingPunct="1">
-      <a:defRPr sz="951" kern="1200">
+    <a:lvl8pPr marL="1267675" algn="l" defTabSz="181095" rtl="0" eaLnBrk="1" latinLnBrk="0" hangingPunct="1">
+      <a:defRPr sz="749" kern="1200">
         <a:solidFill>
           <a:schemeClr val="tx1"/>
         </a:solidFill>
@@ -96,8 +96,8 @@
         <a:cs typeface="+mn-cs"/>
       </a:defRPr>
     </a:lvl8pPr>
-    <a:lvl9pPr marL="1839709" algn="l" defTabSz="229962" rtl="0" eaLnBrk="1" latinLnBrk="0" hangingPunct="1">
-      <a:defRPr sz="951" kern="1200">
+    <a:lvl9pPr marL="1448771" algn="l" defTabSz="181095" rtl="0" eaLnBrk="1" latinLnBrk="0" hangingPunct="1">
+      <a:defRPr sz="749" kern="1200">
         <a:solidFill>
           <a:schemeClr val="tx1"/>
         </a:solidFill>
@@ -110,12 +110,12 @@
   <p:extLst>
     <p:ext uri="{EFAFB233-063F-42B5-8137-9DF3F51BA10A}">
       <p15:sldGuideLst xmlns:p15="http://schemas.microsoft.com/office/powerpoint/2012/main">
-        <p15:guide id="1" orient="horz" pos="864" userDrawn="1">
+        <p15:guide id="1" orient="horz" pos="567" userDrawn="1">
           <p15:clr>
             <a:srgbClr val="A4A3A4"/>
           </p15:clr>
         </p15:guide>
-        <p15:guide id="2" pos="2160" userDrawn="1">
+        <p15:guide id="2" pos="2042" userDrawn="1">
           <p15:clr>
             <a:srgbClr val="A4A3A4"/>
           </p15:clr>
@@ -208,7 +208,7 @@
           <a:p>
             <a:fld id="{C571D33F-B151-5442-9D79-DA0A881D815F}" type="datetimeFigureOut">
               <a:rPr lang="en-US" smtClean="0"/>
-              <a:t>9/19/22</a:t>
+              <a:t>9/7/23</a:t>
             </a:fld>
             <a:endParaRPr lang="en-US"/>
           </a:p>
@@ -226,8 +226,8 @@
         </p:nvSpPr>
         <p:spPr>
           <a:xfrm>
-            <a:off x="-428625" y="1143000"/>
-            <a:ext cx="7715250" cy="3086100"/>
+            <a:off x="-2124075" y="1143000"/>
+            <a:ext cx="11106150" cy="3086100"/>
           </a:xfrm>
           <a:prstGeom prst="rect">
             <a:avLst/>
@@ -381,8 +381,8 @@
   </p:cSld>
   <p:clrMap bg1="lt1" tx1="dk1" bg2="lt2" tx2="dk2" accent1="accent1" accent2="accent2" accent3="accent3" accent4="accent4" accent5="accent5" accent6="accent6" hlink="hlink" folHlink="folHlink"/>
   <p:notesStyle>
-    <a:lvl1pPr marL="0" algn="l" defTabSz="621116" rtl="0" eaLnBrk="1" latinLnBrk="0" hangingPunct="1">
-      <a:defRPr sz="815" kern="1200">
+    <a:lvl1pPr marL="0" algn="l" defTabSz="489129" rtl="0" eaLnBrk="1" latinLnBrk="0" hangingPunct="1">
+      <a:defRPr sz="642" kern="1200">
         <a:solidFill>
           <a:schemeClr val="tx1"/>
         </a:solidFill>
@@ -391,8 +391,8 @@
         <a:cs typeface="+mn-cs"/>
       </a:defRPr>
     </a:lvl1pPr>
-    <a:lvl2pPr marL="310557" algn="l" defTabSz="621116" rtl="0" eaLnBrk="1" latinLnBrk="0" hangingPunct="1">
-      <a:defRPr sz="815" kern="1200">
+    <a:lvl2pPr marL="244564" algn="l" defTabSz="489129" rtl="0" eaLnBrk="1" latinLnBrk="0" hangingPunct="1">
+      <a:defRPr sz="642" kern="1200">
         <a:solidFill>
           <a:schemeClr val="tx1"/>
         </a:solidFill>
@@ -401,8 +401,8 @@
         <a:cs typeface="+mn-cs"/>
       </a:defRPr>
     </a:lvl2pPr>
-    <a:lvl3pPr marL="621116" algn="l" defTabSz="621116" rtl="0" eaLnBrk="1" latinLnBrk="0" hangingPunct="1">
-      <a:defRPr sz="815" kern="1200">
+    <a:lvl3pPr marL="489129" algn="l" defTabSz="489129" rtl="0" eaLnBrk="1" latinLnBrk="0" hangingPunct="1">
+      <a:defRPr sz="642" kern="1200">
         <a:solidFill>
           <a:schemeClr val="tx1"/>
         </a:solidFill>
@@ -411,8 +411,8 @@
         <a:cs typeface="+mn-cs"/>
       </a:defRPr>
     </a:lvl3pPr>
-    <a:lvl4pPr marL="931674" algn="l" defTabSz="621116" rtl="0" eaLnBrk="1" latinLnBrk="0" hangingPunct="1">
-      <a:defRPr sz="815" kern="1200">
+    <a:lvl4pPr marL="733693" algn="l" defTabSz="489129" rtl="0" eaLnBrk="1" latinLnBrk="0" hangingPunct="1">
+      <a:defRPr sz="642" kern="1200">
         <a:solidFill>
           <a:schemeClr val="tx1"/>
         </a:solidFill>
@@ -421,8 +421,8 @@
         <a:cs typeface="+mn-cs"/>
       </a:defRPr>
     </a:lvl4pPr>
-    <a:lvl5pPr marL="1242233" algn="l" defTabSz="621116" rtl="0" eaLnBrk="1" latinLnBrk="0" hangingPunct="1">
-      <a:defRPr sz="815" kern="1200">
+    <a:lvl5pPr marL="978258" algn="l" defTabSz="489129" rtl="0" eaLnBrk="1" latinLnBrk="0" hangingPunct="1">
+      <a:defRPr sz="642" kern="1200">
         <a:solidFill>
           <a:schemeClr val="tx1"/>
         </a:solidFill>
@@ -431,8 +431,8 @@
         <a:cs typeface="+mn-cs"/>
       </a:defRPr>
     </a:lvl5pPr>
-    <a:lvl6pPr marL="1552791" algn="l" defTabSz="621116" rtl="0" eaLnBrk="1" latinLnBrk="0" hangingPunct="1">
-      <a:defRPr sz="815" kern="1200">
+    <a:lvl6pPr marL="1222823" algn="l" defTabSz="489129" rtl="0" eaLnBrk="1" latinLnBrk="0" hangingPunct="1">
+      <a:defRPr sz="642" kern="1200">
         <a:solidFill>
           <a:schemeClr val="tx1"/>
         </a:solidFill>
@@ -441,8 +441,8 @@
         <a:cs typeface="+mn-cs"/>
       </a:defRPr>
     </a:lvl6pPr>
-    <a:lvl7pPr marL="1863349" algn="l" defTabSz="621116" rtl="0" eaLnBrk="1" latinLnBrk="0" hangingPunct="1">
-      <a:defRPr sz="815" kern="1200">
+    <a:lvl7pPr marL="1467387" algn="l" defTabSz="489129" rtl="0" eaLnBrk="1" latinLnBrk="0" hangingPunct="1">
+      <a:defRPr sz="642" kern="1200">
         <a:solidFill>
           <a:schemeClr val="tx1"/>
         </a:solidFill>
@@ -451,8 +451,8 @@
         <a:cs typeface="+mn-cs"/>
       </a:defRPr>
     </a:lvl7pPr>
-    <a:lvl8pPr marL="2173908" algn="l" defTabSz="621116" rtl="0" eaLnBrk="1" latinLnBrk="0" hangingPunct="1">
-      <a:defRPr sz="815" kern="1200">
+    <a:lvl8pPr marL="1711953" algn="l" defTabSz="489129" rtl="0" eaLnBrk="1" latinLnBrk="0" hangingPunct="1">
+      <a:defRPr sz="642" kern="1200">
         <a:solidFill>
           <a:schemeClr val="tx1"/>
         </a:solidFill>
@@ -461,8 +461,8 @@
         <a:cs typeface="+mn-cs"/>
       </a:defRPr>
     </a:lvl8pPr>
-    <a:lvl9pPr marL="2484466" algn="l" defTabSz="621116" rtl="0" eaLnBrk="1" latinLnBrk="0" hangingPunct="1">
-      <a:defRPr sz="815" kern="1200">
+    <a:lvl9pPr marL="1956517" algn="l" defTabSz="489129" rtl="0" eaLnBrk="1" latinLnBrk="0" hangingPunct="1">
+      <a:defRPr sz="642" kern="1200">
         <a:solidFill>
           <a:schemeClr val="tx1"/>
         </a:solidFill>
@@ -504,8 +504,8 @@
         </p:nvSpPr>
         <p:spPr>
           <a:xfrm>
-            <a:off x="-428625" y="1143000"/>
-            <a:ext cx="7715250" cy="3086100"/>
+            <a:off x="-2124075" y="1143000"/>
+            <a:ext cx="11106150" cy="3086100"/>
           </a:xfrm>
         </p:spPr>
       </p:sp>
@@ -593,8 +593,8 @@
         </p:nvSpPr>
         <p:spPr>
           <a:xfrm>
-            <a:off x="514360" y="852181"/>
-            <a:ext cx="5829299" cy="588009"/>
+            <a:off x="486024" y="559246"/>
+            <a:ext cx="5508148" cy="385881"/>
           </a:xfrm>
         </p:spPr>
         <p:txBody>
@@ -620,8 +620,8 @@
         </p:nvSpPr>
         <p:spPr>
           <a:xfrm>
-            <a:off x="1028709" y="1554491"/>
-            <a:ext cx="4800602" cy="701039"/>
+            <a:off x="972034" y="1020135"/>
+            <a:ext cx="4536125" cy="460056"/>
           </a:xfrm>
         </p:spPr>
         <p:txBody>
@@ -637,7 +637,7 @@
                 </a:solidFill>
               </a:defRPr>
             </a:lvl1pPr>
-            <a:lvl2pPr marL="1044394" indent="0" algn="ctr">
+            <a:lvl2pPr marL="870189" indent="0" algn="ctr">
               <a:buNone/>
               <a:defRPr>
                 <a:solidFill>
@@ -647,7 +647,7 @@
                 </a:solidFill>
               </a:defRPr>
             </a:lvl2pPr>
-            <a:lvl3pPr marL="2088799" indent="0" algn="ctr">
+            <a:lvl3pPr marL="1740387" indent="0" algn="ctr">
               <a:buNone/>
               <a:defRPr>
                 <a:solidFill>
@@ -657,7 +657,7 @@
                 </a:solidFill>
               </a:defRPr>
             </a:lvl3pPr>
-            <a:lvl4pPr marL="3133193" indent="0" algn="ctr">
+            <a:lvl4pPr marL="2610576" indent="0" algn="ctr">
               <a:buNone/>
               <a:defRPr>
                 <a:solidFill>
@@ -667,7 +667,7 @@
                 </a:solidFill>
               </a:defRPr>
             </a:lvl4pPr>
-            <a:lvl5pPr marL="4177585" indent="0" algn="ctr">
+            <a:lvl5pPr marL="3480764" indent="0" algn="ctr">
               <a:buNone/>
               <a:defRPr>
                 <a:solidFill>
@@ -677,7 +677,7 @@
                 </a:solidFill>
               </a:defRPr>
             </a:lvl5pPr>
-            <a:lvl6pPr marL="5221993" indent="0" algn="ctr">
+            <a:lvl6pPr marL="4350965" indent="0" algn="ctr">
               <a:buNone/>
               <a:defRPr>
                 <a:solidFill>
@@ -687,7 +687,7 @@
                 </a:solidFill>
               </a:defRPr>
             </a:lvl6pPr>
-            <a:lvl7pPr marL="6266385" indent="0" algn="ctr">
+            <a:lvl7pPr marL="5221152" indent="0" algn="ctr">
               <a:buNone/>
               <a:defRPr>
                 <a:solidFill>
@@ -697,7 +697,7 @@
                 </a:solidFill>
               </a:defRPr>
             </a:lvl7pPr>
-            <a:lvl8pPr marL="7310790" indent="0" algn="ctr">
+            <a:lvl8pPr marL="6091350" indent="0" algn="ctr">
               <a:buNone/>
               <a:defRPr>
                 <a:solidFill>
@@ -707,7 +707,7 @@
                 </a:solidFill>
               </a:defRPr>
             </a:lvl8pPr>
-            <a:lvl9pPr marL="8355191" indent="0" algn="ctr">
+            <a:lvl9pPr marL="6961545" indent="0" algn="ctr">
               <a:buNone/>
               <a:defRPr>
                 <a:solidFill>
@@ -743,7 +743,7 @@
           <a:p>
             <a:fld id="{01197F44-DB72-474A-9754-31703E05C006}" type="datetimeFigureOut">
               <a:rPr lang="en-US" smtClean="0"/>
-              <a:t>9/19/22</a:t>
+              <a:t>9/7/23</a:t>
             </a:fld>
             <a:endParaRPr lang="en-US"/>
           </a:p>
@@ -911,7 +911,7 @@
           <a:p>
             <a:fld id="{01197F44-DB72-474A-9754-31703E05C006}" type="datetimeFigureOut">
               <a:rPr lang="en-US" smtClean="0"/>
-              <a:t>9/19/22</a:t>
+              <a:t>9/7/23</a:t>
             </a:fld>
             <a:endParaRPr lang="en-US"/>
           </a:p>
@@ -1001,8 +1001,8 @@
         </p:nvSpPr>
         <p:spPr>
           <a:xfrm>
-            <a:off x="4972052" y="109857"/>
-            <a:ext cx="1543050" cy="2340612"/>
+            <a:off x="4698129" y="72094"/>
+            <a:ext cx="1458039" cy="1536026"/>
           </a:xfrm>
         </p:spPr>
         <p:txBody>
@@ -1028,8 +1028,8 @@
         </p:nvSpPr>
         <p:spPr>
           <a:xfrm>
-            <a:off x="342904" y="109857"/>
-            <a:ext cx="4514850" cy="2340612"/>
+            <a:off x="324013" y="72094"/>
+            <a:ext cx="4266114" cy="1536026"/>
           </a:xfrm>
         </p:spPr>
         <p:txBody>
@@ -1089,7 +1089,7 @@
           <a:p>
             <a:fld id="{01197F44-DB72-474A-9754-31703E05C006}" type="datetimeFigureOut">
               <a:rPr lang="en-US" smtClean="0"/>
-              <a:t>9/19/22</a:t>
+              <a:t>9/7/23</a:t>
             </a:fld>
             <a:endParaRPr lang="en-US"/>
           </a:p>
@@ -1257,7 +1257,7 @@
           <a:p>
             <a:fld id="{01197F44-DB72-474A-9754-31703E05C006}" type="datetimeFigureOut">
               <a:rPr lang="en-US" smtClean="0"/>
-              <a:t>9/19/22</a:t>
+              <a:t>9/7/23</a:t>
             </a:fld>
             <a:endParaRPr lang="en-US"/>
           </a:p>
@@ -1347,15 +1347,15 @@
         </p:nvSpPr>
         <p:spPr>
           <a:xfrm>
-            <a:off x="541747" y="1762772"/>
-            <a:ext cx="5829299" cy="544831"/>
+            <a:off x="511902" y="1156819"/>
+            <a:ext cx="5508148" cy="357546"/>
           </a:xfrm>
         </p:spPr>
         <p:txBody>
           <a:bodyPr anchor="t"/>
           <a:lstStyle>
             <a:lvl1pPr algn="l">
-              <a:defRPr sz="9254" b="1" cap="all"/>
+              <a:defRPr sz="7710" b="1" cap="all"/>
             </a:lvl1pPr>
           </a:lstStyle>
           <a:p>
@@ -1378,8 +1378,8 @@
         </p:nvSpPr>
         <p:spPr>
           <a:xfrm>
-            <a:off x="541747" y="1162696"/>
-            <a:ext cx="5829299" cy="600075"/>
+            <a:off x="511902" y="763020"/>
+            <a:ext cx="5508148" cy="393800"/>
           </a:xfrm>
         </p:spPr>
         <p:txBody>
@@ -1387,7 +1387,7 @@
           <a:lstStyle>
             <a:lvl1pPr marL="0" indent="0">
               <a:buNone/>
-              <a:defRPr sz="4936">
+              <a:defRPr sz="4113">
                 <a:solidFill>
                   <a:schemeClr val="tx1">
                     <a:tint val="75000"/>
@@ -1395,9 +1395,9 @@
                 </a:solidFill>
               </a:defRPr>
             </a:lvl1pPr>
-            <a:lvl2pPr marL="1044394" indent="0">
-              <a:buNone/>
-              <a:defRPr sz="4318">
+            <a:lvl2pPr marL="870189" indent="0">
+              <a:buNone/>
+              <a:defRPr sz="3598">
                 <a:solidFill>
                   <a:schemeClr val="tx1">
                     <a:tint val="75000"/>
@@ -1405,9 +1405,9 @@
                 </a:solidFill>
               </a:defRPr>
             </a:lvl2pPr>
-            <a:lvl3pPr marL="2088799" indent="0">
-              <a:buNone/>
-              <a:defRPr sz="3702">
+            <a:lvl3pPr marL="1740387" indent="0">
+              <a:buNone/>
+              <a:defRPr sz="3085">
                 <a:solidFill>
                   <a:schemeClr val="tx1">
                     <a:tint val="75000"/>
@@ -1415,9 +1415,9 @@
                 </a:solidFill>
               </a:defRPr>
             </a:lvl3pPr>
-            <a:lvl4pPr marL="3133193" indent="0">
-              <a:buNone/>
-              <a:defRPr sz="3084">
+            <a:lvl4pPr marL="2610576" indent="0">
+              <a:buNone/>
+              <a:defRPr sz="2570">
                 <a:solidFill>
                   <a:schemeClr val="tx1">
                     <a:tint val="75000"/>
@@ -1425,9 +1425,9 @@
                 </a:solidFill>
               </a:defRPr>
             </a:lvl4pPr>
-            <a:lvl5pPr marL="4177585" indent="0">
-              <a:buNone/>
-              <a:defRPr sz="3084">
+            <a:lvl5pPr marL="3480764" indent="0">
+              <a:buNone/>
+              <a:defRPr sz="2570">
                 <a:solidFill>
                   <a:schemeClr val="tx1">
                     <a:tint val="75000"/>
@@ -1435,9 +1435,9 @@
                 </a:solidFill>
               </a:defRPr>
             </a:lvl5pPr>
-            <a:lvl6pPr marL="5221993" indent="0">
-              <a:buNone/>
-              <a:defRPr sz="3084">
+            <a:lvl6pPr marL="4350965" indent="0">
+              <a:buNone/>
+              <a:defRPr sz="2570">
                 <a:solidFill>
                   <a:schemeClr val="tx1">
                     <a:tint val="75000"/>
@@ -1445,9 +1445,9 @@
                 </a:solidFill>
               </a:defRPr>
             </a:lvl6pPr>
-            <a:lvl7pPr marL="6266385" indent="0">
-              <a:buNone/>
-              <a:defRPr sz="3084">
+            <a:lvl7pPr marL="5221152" indent="0">
+              <a:buNone/>
+              <a:defRPr sz="2570">
                 <a:solidFill>
                   <a:schemeClr val="tx1">
                     <a:tint val="75000"/>
@@ -1455,9 +1455,9 @@
                 </a:solidFill>
               </a:defRPr>
             </a:lvl7pPr>
-            <a:lvl8pPr marL="7310790" indent="0">
-              <a:buNone/>
-              <a:defRPr sz="3084">
+            <a:lvl8pPr marL="6091350" indent="0">
+              <a:buNone/>
+              <a:defRPr sz="2570">
                 <a:solidFill>
                   <a:schemeClr val="tx1">
                     <a:tint val="75000"/>
@@ -1465,9 +1465,9 @@
                 </a:solidFill>
               </a:defRPr>
             </a:lvl8pPr>
-            <a:lvl9pPr marL="8355191" indent="0">
-              <a:buNone/>
-              <a:defRPr sz="3084">
+            <a:lvl9pPr marL="6961545" indent="0">
+              <a:buNone/>
+              <a:defRPr sz="2570">
                 <a:solidFill>
                   <a:schemeClr val="tx1">
                     <a:tint val="75000"/>
@@ -1502,7 +1502,7 @@
           <a:p>
             <a:fld id="{01197F44-DB72-474A-9754-31703E05C006}" type="datetimeFigureOut">
               <a:rPr lang="en-US" smtClean="0"/>
-              <a:t>9/19/22</a:t>
+              <a:t>9/7/23</a:t>
             </a:fld>
             <a:endParaRPr lang="en-US"/>
           </a:p>
@@ -1614,39 +1614,39 @@
         </p:nvSpPr>
         <p:spPr>
           <a:xfrm>
-            <a:off x="342904" y="640093"/>
-            <a:ext cx="3028952" cy="1810385"/>
+            <a:off x="324012" y="420063"/>
+            <a:ext cx="2862080" cy="1188065"/>
           </a:xfrm>
         </p:spPr>
         <p:txBody>
           <a:bodyPr/>
           <a:lstStyle>
             <a:lvl1pPr>
-              <a:defRPr sz="6787"/>
+              <a:defRPr sz="5655"/>
             </a:lvl1pPr>
             <a:lvl2pPr>
-              <a:defRPr sz="5553"/>
+              <a:defRPr sz="4627"/>
             </a:lvl2pPr>
             <a:lvl3pPr>
-              <a:defRPr sz="4936"/>
+              <a:defRPr sz="4113"/>
             </a:lvl3pPr>
             <a:lvl4pPr>
-              <a:defRPr sz="4318"/>
+              <a:defRPr sz="3598"/>
             </a:lvl4pPr>
             <a:lvl5pPr>
-              <a:defRPr sz="4318"/>
+              <a:defRPr sz="3598"/>
             </a:lvl5pPr>
             <a:lvl6pPr>
-              <a:defRPr sz="4318"/>
+              <a:defRPr sz="3598"/>
             </a:lvl6pPr>
             <a:lvl7pPr>
-              <a:defRPr sz="4318"/>
+              <a:defRPr sz="3598"/>
             </a:lvl7pPr>
             <a:lvl8pPr>
-              <a:defRPr sz="4318"/>
+              <a:defRPr sz="3598"/>
             </a:lvl8pPr>
             <a:lvl9pPr>
-              <a:defRPr sz="4318"/>
+              <a:defRPr sz="3598"/>
             </a:lvl9pPr>
           </a:lstStyle>
           <a:p>
@@ -1698,39 +1698,39 @@
         </p:nvSpPr>
         <p:spPr>
           <a:xfrm>
-            <a:off x="3486159" y="640093"/>
-            <a:ext cx="3028952" cy="1810385"/>
+            <a:off x="3294096" y="420063"/>
+            <a:ext cx="2862080" cy="1188065"/>
           </a:xfrm>
         </p:spPr>
         <p:txBody>
           <a:bodyPr/>
           <a:lstStyle>
             <a:lvl1pPr>
-              <a:defRPr sz="6787"/>
+              <a:defRPr sz="5655"/>
             </a:lvl1pPr>
             <a:lvl2pPr>
-              <a:defRPr sz="5553"/>
+              <a:defRPr sz="4627"/>
             </a:lvl2pPr>
             <a:lvl3pPr>
-              <a:defRPr sz="4936"/>
+              <a:defRPr sz="4113"/>
             </a:lvl3pPr>
             <a:lvl4pPr>
-              <a:defRPr sz="4318"/>
+              <a:defRPr sz="3598"/>
             </a:lvl4pPr>
             <a:lvl5pPr>
-              <a:defRPr sz="4318"/>
+              <a:defRPr sz="3598"/>
             </a:lvl5pPr>
             <a:lvl6pPr>
-              <a:defRPr sz="4318"/>
+              <a:defRPr sz="3598"/>
             </a:lvl6pPr>
             <a:lvl7pPr>
-              <a:defRPr sz="4318"/>
+              <a:defRPr sz="3598"/>
             </a:lvl7pPr>
             <a:lvl8pPr>
-              <a:defRPr sz="4318"/>
+              <a:defRPr sz="3598"/>
             </a:lvl8pPr>
             <a:lvl9pPr>
-              <a:defRPr sz="4318"/>
+              <a:defRPr sz="3598"/>
             </a:lvl9pPr>
           </a:lstStyle>
           <a:p>
@@ -1787,7 +1787,7 @@
           <a:p>
             <a:fld id="{01197F44-DB72-474A-9754-31703E05C006}" type="datetimeFigureOut">
               <a:rPr lang="en-US" smtClean="0"/>
-              <a:t>9/19/22</a:t>
+              <a:t>9/7/23</a:t>
             </a:fld>
             <a:endParaRPr lang="en-US"/>
           </a:p>
@@ -1903,8 +1903,8 @@
         </p:nvSpPr>
         <p:spPr>
           <a:xfrm>
-            <a:off x="342909" y="614056"/>
-            <a:ext cx="3030143" cy="255903"/>
+            <a:off x="324017" y="402975"/>
+            <a:ext cx="2863205" cy="167936"/>
           </a:xfrm>
         </p:spPr>
         <p:txBody>
@@ -1912,39 +1912,39 @@
           <a:lstStyle>
             <a:lvl1pPr marL="0" indent="0">
               <a:buNone/>
-              <a:defRPr sz="5553" b="1"/>
+              <a:defRPr sz="4627" b="1"/>
             </a:lvl1pPr>
-            <a:lvl2pPr marL="1044394" indent="0">
-              <a:buNone/>
-              <a:defRPr sz="4936" b="1"/>
+            <a:lvl2pPr marL="870189" indent="0">
+              <a:buNone/>
+              <a:defRPr sz="4113" b="1"/>
             </a:lvl2pPr>
-            <a:lvl3pPr marL="2088799" indent="0">
-              <a:buNone/>
-              <a:defRPr sz="4318" b="1"/>
+            <a:lvl3pPr marL="1740387" indent="0">
+              <a:buNone/>
+              <a:defRPr sz="3598" b="1"/>
             </a:lvl3pPr>
-            <a:lvl4pPr marL="3133193" indent="0">
-              <a:buNone/>
-              <a:defRPr sz="3702" b="1"/>
+            <a:lvl4pPr marL="2610576" indent="0">
+              <a:buNone/>
+              <a:defRPr sz="3085" b="1"/>
             </a:lvl4pPr>
-            <a:lvl5pPr marL="4177585" indent="0">
-              <a:buNone/>
-              <a:defRPr sz="3702" b="1"/>
+            <a:lvl5pPr marL="3480764" indent="0">
+              <a:buNone/>
+              <a:defRPr sz="3085" b="1"/>
             </a:lvl5pPr>
-            <a:lvl6pPr marL="5221993" indent="0">
-              <a:buNone/>
-              <a:defRPr sz="3702" b="1"/>
+            <a:lvl6pPr marL="4350965" indent="0">
+              <a:buNone/>
+              <a:defRPr sz="3085" b="1"/>
             </a:lvl6pPr>
-            <a:lvl7pPr marL="6266385" indent="0">
-              <a:buNone/>
-              <a:defRPr sz="3702" b="1"/>
+            <a:lvl7pPr marL="5221152" indent="0">
+              <a:buNone/>
+              <a:defRPr sz="3085" b="1"/>
             </a:lvl7pPr>
-            <a:lvl8pPr marL="7310790" indent="0">
-              <a:buNone/>
-              <a:defRPr sz="3702" b="1"/>
+            <a:lvl8pPr marL="6091350" indent="0">
+              <a:buNone/>
+              <a:defRPr sz="3085" b="1"/>
             </a:lvl8pPr>
-            <a:lvl9pPr marL="8355191" indent="0">
-              <a:buNone/>
-              <a:defRPr sz="3702" b="1"/>
+            <a:lvl9pPr marL="6961545" indent="0">
+              <a:buNone/>
+              <a:defRPr sz="3085" b="1"/>
             </a:lvl9pPr>
           </a:lstStyle>
           <a:p>
@@ -1968,39 +1968,39 @@
         </p:nvSpPr>
         <p:spPr>
           <a:xfrm>
-            <a:off x="342909" y="869956"/>
-            <a:ext cx="3030143" cy="1580517"/>
+            <a:off x="324017" y="570909"/>
+            <a:ext cx="2863205" cy="1037214"/>
           </a:xfrm>
         </p:spPr>
         <p:txBody>
           <a:bodyPr/>
           <a:lstStyle>
             <a:lvl1pPr>
-              <a:defRPr sz="5553"/>
+              <a:defRPr sz="4627"/>
             </a:lvl1pPr>
             <a:lvl2pPr>
-              <a:defRPr sz="4936"/>
+              <a:defRPr sz="4113"/>
             </a:lvl2pPr>
             <a:lvl3pPr>
-              <a:defRPr sz="4318"/>
+              <a:defRPr sz="3598"/>
             </a:lvl3pPr>
             <a:lvl4pPr>
-              <a:defRPr sz="3702"/>
+              <a:defRPr sz="3085"/>
             </a:lvl4pPr>
             <a:lvl5pPr>
-              <a:defRPr sz="3702"/>
+              <a:defRPr sz="3085"/>
             </a:lvl5pPr>
             <a:lvl6pPr>
-              <a:defRPr sz="3702"/>
+              <a:defRPr sz="3085"/>
             </a:lvl6pPr>
             <a:lvl7pPr>
-              <a:defRPr sz="3702"/>
+              <a:defRPr sz="3085"/>
             </a:lvl7pPr>
             <a:lvl8pPr>
-              <a:defRPr sz="3702"/>
+              <a:defRPr sz="3085"/>
             </a:lvl8pPr>
             <a:lvl9pPr>
-              <a:defRPr sz="3702"/>
+              <a:defRPr sz="3085"/>
             </a:lvl9pPr>
           </a:lstStyle>
           <a:p>
@@ -2052,8 +2052,8 @@
         </p:nvSpPr>
         <p:spPr>
           <a:xfrm>
-            <a:off x="3483777" y="614056"/>
-            <a:ext cx="3031332" cy="255903"/>
+            <a:off x="3291847" y="402975"/>
+            <a:ext cx="2864328" cy="167936"/>
           </a:xfrm>
         </p:spPr>
         <p:txBody>
@@ -2061,39 +2061,39 @@
           <a:lstStyle>
             <a:lvl1pPr marL="0" indent="0">
               <a:buNone/>
-              <a:defRPr sz="5553" b="1"/>
+              <a:defRPr sz="4627" b="1"/>
             </a:lvl1pPr>
-            <a:lvl2pPr marL="1044394" indent="0">
-              <a:buNone/>
-              <a:defRPr sz="4936" b="1"/>
+            <a:lvl2pPr marL="870189" indent="0">
+              <a:buNone/>
+              <a:defRPr sz="4113" b="1"/>
             </a:lvl2pPr>
-            <a:lvl3pPr marL="2088799" indent="0">
-              <a:buNone/>
-              <a:defRPr sz="4318" b="1"/>
+            <a:lvl3pPr marL="1740387" indent="0">
+              <a:buNone/>
+              <a:defRPr sz="3598" b="1"/>
             </a:lvl3pPr>
-            <a:lvl4pPr marL="3133193" indent="0">
-              <a:buNone/>
-              <a:defRPr sz="3702" b="1"/>
+            <a:lvl4pPr marL="2610576" indent="0">
+              <a:buNone/>
+              <a:defRPr sz="3085" b="1"/>
             </a:lvl4pPr>
-            <a:lvl5pPr marL="4177585" indent="0">
-              <a:buNone/>
-              <a:defRPr sz="3702" b="1"/>
+            <a:lvl5pPr marL="3480764" indent="0">
+              <a:buNone/>
+              <a:defRPr sz="3085" b="1"/>
             </a:lvl5pPr>
-            <a:lvl6pPr marL="5221993" indent="0">
-              <a:buNone/>
-              <a:defRPr sz="3702" b="1"/>
+            <a:lvl6pPr marL="4350965" indent="0">
+              <a:buNone/>
+              <a:defRPr sz="3085" b="1"/>
             </a:lvl6pPr>
-            <a:lvl7pPr marL="6266385" indent="0">
-              <a:buNone/>
-              <a:defRPr sz="3702" b="1"/>
+            <a:lvl7pPr marL="5221152" indent="0">
+              <a:buNone/>
+              <a:defRPr sz="3085" b="1"/>
             </a:lvl7pPr>
-            <a:lvl8pPr marL="7310790" indent="0">
-              <a:buNone/>
-              <a:defRPr sz="3702" b="1"/>
+            <a:lvl8pPr marL="6091350" indent="0">
+              <a:buNone/>
+              <a:defRPr sz="3085" b="1"/>
             </a:lvl8pPr>
-            <a:lvl9pPr marL="8355191" indent="0">
-              <a:buNone/>
-              <a:defRPr sz="3702" b="1"/>
+            <a:lvl9pPr marL="6961545" indent="0">
+              <a:buNone/>
+              <a:defRPr sz="3085" b="1"/>
             </a:lvl9pPr>
           </a:lstStyle>
           <a:p>
@@ -2117,39 +2117,39 @@
         </p:nvSpPr>
         <p:spPr>
           <a:xfrm>
-            <a:off x="3483777" y="869956"/>
-            <a:ext cx="3031332" cy="1580517"/>
+            <a:off x="3291847" y="570909"/>
+            <a:ext cx="2864328" cy="1037214"/>
           </a:xfrm>
         </p:spPr>
         <p:txBody>
           <a:bodyPr/>
           <a:lstStyle>
             <a:lvl1pPr>
-              <a:defRPr sz="5553"/>
+              <a:defRPr sz="4627"/>
             </a:lvl1pPr>
             <a:lvl2pPr>
-              <a:defRPr sz="4936"/>
+              <a:defRPr sz="4113"/>
             </a:lvl2pPr>
             <a:lvl3pPr>
-              <a:defRPr sz="4318"/>
+              <a:defRPr sz="3598"/>
             </a:lvl3pPr>
             <a:lvl4pPr>
-              <a:defRPr sz="3702"/>
+              <a:defRPr sz="3085"/>
             </a:lvl4pPr>
             <a:lvl5pPr>
-              <a:defRPr sz="3702"/>
+              <a:defRPr sz="3085"/>
             </a:lvl5pPr>
             <a:lvl6pPr>
-              <a:defRPr sz="3702"/>
+              <a:defRPr sz="3085"/>
             </a:lvl6pPr>
             <a:lvl7pPr>
-              <a:defRPr sz="3702"/>
+              <a:defRPr sz="3085"/>
             </a:lvl7pPr>
             <a:lvl8pPr>
-              <a:defRPr sz="3702"/>
+              <a:defRPr sz="3085"/>
             </a:lvl8pPr>
             <a:lvl9pPr>
-              <a:defRPr sz="3702"/>
+              <a:defRPr sz="3085"/>
             </a:lvl9pPr>
           </a:lstStyle>
           <a:p>
@@ -2206,7 +2206,7 @@
           <a:p>
             <a:fld id="{01197F44-DB72-474A-9754-31703E05C006}" type="datetimeFigureOut">
               <a:rPr lang="en-US" smtClean="0"/>
-              <a:t>9/19/22</a:t>
+              <a:t>9/7/23</a:t>
             </a:fld>
             <a:endParaRPr lang="en-US"/>
           </a:p>
@@ -2323,7 +2323,7 @@
           <a:p>
             <a:fld id="{01197F44-DB72-474A-9754-31703E05C006}" type="datetimeFigureOut">
               <a:rPr lang="en-US" smtClean="0"/>
-              <a:t>9/19/22</a:t>
+              <a:t>9/7/23</a:t>
             </a:fld>
             <a:endParaRPr lang="en-US"/>
           </a:p>
@@ -2418,7 +2418,7 @@
           <a:p>
             <a:fld id="{01197F44-DB72-474A-9754-31703E05C006}" type="datetimeFigureOut">
               <a:rPr lang="en-US" smtClean="0"/>
-              <a:t>9/19/22</a:t>
+              <a:t>9/7/23</a:t>
             </a:fld>
             <a:endParaRPr lang="en-US"/>
           </a:p>
@@ -2508,15 +2508,15 @@
         </p:nvSpPr>
         <p:spPr>
           <a:xfrm>
-            <a:off x="342907" y="109229"/>
-            <a:ext cx="2256235" cy="464821"/>
+            <a:off x="324017" y="71682"/>
+            <a:ext cx="2131933" cy="305038"/>
           </a:xfrm>
         </p:spPr>
         <p:txBody>
           <a:bodyPr anchor="b"/>
           <a:lstStyle>
             <a:lvl1pPr algn="l">
-              <a:defRPr sz="4936" b="1"/>
+              <a:defRPr sz="4113" b="1"/>
             </a:lvl1pPr>
           </a:lstStyle>
           <a:p>
@@ -2539,39 +2539,39 @@
         </p:nvSpPr>
         <p:spPr>
           <a:xfrm>
-            <a:off x="2681299" y="109230"/>
-            <a:ext cx="3833813" cy="2341245"/>
+            <a:off x="2533579" y="71683"/>
+            <a:ext cx="3622598" cy="1536442"/>
           </a:xfrm>
         </p:spPr>
         <p:txBody>
           <a:bodyPr/>
           <a:lstStyle>
             <a:lvl1pPr>
-              <a:defRPr sz="8022"/>
+              <a:defRPr sz="6684"/>
             </a:lvl1pPr>
             <a:lvl2pPr>
-              <a:defRPr sz="6787"/>
+              <a:defRPr sz="5655"/>
             </a:lvl2pPr>
             <a:lvl3pPr>
-              <a:defRPr sz="5553"/>
+              <a:defRPr sz="4627"/>
             </a:lvl3pPr>
             <a:lvl4pPr>
-              <a:defRPr sz="4936"/>
+              <a:defRPr sz="4113"/>
             </a:lvl4pPr>
             <a:lvl5pPr>
-              <a:defRPr sz="4936"/>
+              <a:defRPr sz="4113"/>
             </a:lvl5pPr>
             <a:lvl6pPr>
-              <a:defRPr sz="4936"/>
+              <a:defRPr sz="4113"/>
             </a:lvl6pPr>
             <a:lvl7pPr>
-              <a:defRPr sz="4936"/>
+              <a:defRPr sz="4113"/>
             </a:lvl7pPr>
             <a:lvl8pPr>
-              <a:defRPr sz="4936"/>
+              <a:defRPr sz="4113"/>
             </a:lvl8pPr>
             <a:lvl9pPr>
-              <a:defRPr sz="4936"/>
+              <a:defRPr sz="4113"/>
             </a:lvl9pPr>
           </a:lstStyle>
           <a:p>
@@ -2623,8 +2623,8 @@
         </p:nvSpPr>
         <p:spPr>
           <a:xfrm>
-            <a:off x="342907" y="574049"/>
-            <a:ext cx="2256235" cy="1876425"/>
+            <a:off x="324017" y="376720"/>
+            <a:ext cx="2131933" cy="1231404"/>
           </a:xfrm>
         </p:spPr>
         <p:txBody>
@@ -2632,39 +2632,39 @@
           <a:lstStyle>
             <a:lvl1pPr marL="0" indent="0">
               <a:buNone/>
-              <a:defRPr sz="3084"/>
+              <a:defRPr sz="2570"/>
             </a:lvl1pPr>
-            <a:lvl2pPr marL="1044394" indent="0">
-              <a:buNone/>
-              <a:defRPr sz="2468"/>
+            <a:lvl2pPr marL="870189" indent="0">
+              <a:buNone/>
+              <a:defRPr sz="2056"/>
             </a:lvl2pPr>
-            <a:lvl3pPr marL="2088799" indent="0">
-              <a:buNone/>
-              <a:defRPr sz="1851"/>
+            <a:lvl3pPr marL="1740387" indent="0">
+              <a:buNone/>
+              <a:defRPr sz="1542"/>
             </a:lvl3pPr>
-            <a:lvl4pPr marL="3133193" indent="0">
-              <a:buNone/>
-              <a:defRPr sz="1851"/>
+            <a:lvl4pPr marL="2610576" indent="0">
+              <a:buNone/>
+              <a:defRPr sz="1542"/>
             </a:lvl4pPr>
-            <a:lvl5pPr marL="4177585" indent="0">
-              <a:buNone/>
-              <a:defRPr sz="1851"/>
+            <a:lvl5pPr marL="3480764" indent="0">
+              <a:buNone/>
+              <a:defRPr sz="1542"/>
             </a:lvl5pPr>
-            <a:lvl6pPr marL="5221993" indent="0">
-              <a:buNone/>
-              <a:defRPr sz="1851"/>
+            <a:lvl6pPr marL="4350965" indent="0">
+              <a:buNone/>
+              <a:defRPr sz="1542"/>
             </a:lvl6pPr>
-            <a:lvl7pPr marL="6266385" indent="0">
-              <a:buNone/>
-              <a:defRPr sz="1851"/>
+            <a:lvl7pPr marL="5221152" indent="0">
+              <a:buNone/>
+              <a:defRPr sz="1542"/>
             </a:lvl7pPr>
-            <a:lvl8pPr marL="7310790" indent="0">
-              <a:buNone/>
-              <a:defRPr sz="1851"/>
+            <a:lvl8pPr marL="6091350" indent="0">
+              <a:buNone/>
+              <a:defRPr sz="1542"/>
             </a:lvl8pPr>
-            <a:lvl9pPr marL="8355191" indent="0">
-              <a:buNone/>
-              <a:defRPr sz="1851"/>
+            <a:lvl9pPr marL="6961545" indent="0">
+              <a:buNone/>
+              <a:defRPr sz="1542"/>
             </a:lvl9pPr>
           </a:lstStyle>
           <a:p>
@@ -2693,7 +2693,7 @@
           <a:p>
             <a:fld id="{01197F44-DB72-474A-9754-31703E05C006}" type="datetimeFigureOut">
               <a:rPr lang="en-US" smtClean="0"/>
-              <a:t>9/19/22</a:t>
+              <a:t>9/7/23</a:t>
             </a:fld>
             <a:endParaRPr lang="en-US"/>
           </a:p>
@@ -2783,15 +2783,15 @@
         </p:nvSpPr>
         <p:spPr>
           <a:xfrm>
-            <a:off x="1344220" y="1920250"/>
-            <a:ext cx="4114800" cy="226695"/>
+            <a:off x="1270164" y="1260166"/>
+            <a:ext cx="3888105" cy="148769"/>
           </a:xfrm>
         </p:spPr>
         <p:txBody>
           <a:bodyPr anchor="b"/>
           <a:lstStyle>
             <a:lvl1pPr algn="l">
-              <a:defRPr sz="4936" b="1"/>
+              <a:defRPr sz="4113" b="1"/>
             </a:lvl1pPr>
           </a:lstStyle>
           <a:p>
@@ -2814,8 +2814,8 @@
         </p:nvSpPr>
         <p:spPr>
           <a:xfrm>
-            <a:off x="1344220" y="245110"/>
-            <a:ext cx="4114800" cy="1645920"/>
+            <a:off x="1270164" y="160854"/>
+            <a:ext cx="3888105" cy="1080135"/>
           </a:xfrm>
         </p:spPr>
         <p:txBody>
@@ -2823,39 +2823,39 @@
           <a:lstStyle>
             <a:lvl1pPr marL="0" indent="0">
               <a:buNone/>
-              <a:defRPr sz="8022"/>
+              <a:defRPr sz="6684"/>
             </a:lvl1pPr>
-            <a:lvl2pPr marL="1044394" indent="0">
-              <a:buNone/>
-              <a:defRPr sz="6787"/>
+            <a:lvl2pPr marL="870189" indent="0">
+              <a:buNone/>
+              <a:defRPr sz="5655"/>
             </a:lvl2pPr>
-            <a:lvl3pPr marL="2088799" indent="0">
-              <a:buNone/>
-              <a:defRPr sz="5553"/>
+            <a:lvl3pPr marL="1740387" indent="0">
+              <a:buNone/>
+              <a:defRPr sz="4627"/>
             </a:lvl3pPr>
-            <a:lvl4pPr marL="3133193" indent="0">
-              <a:buNone/>
-              <a:defRPr sz="4936"/>
+            <a:lvl4pPr marL="2610576" indent="0">
+              <a:buNone/>
+              <a:defRPr sz="4113"/>
             </a:lvl4pPr>
-            <a:lvl5pPr marL="4177585" indent="0">
-              <a:buNone/>
-              <a:defRPr sz="4936"/>
+            <a:lvl5pPr marL="3480764" indent="0">
+              <a:buNone/>
+              <a:defRPr sz="4113"/>
             </a:lvl5pPr>
-            <a:lvl6pPr marL="5221993" indent="0">
-              <a:buNone/>
-              <a:defRPr sz="4936"/>
+            <a:lvl6pPr marL="4350965" indent="0">
+              <a:buNone/>
+              <a:defRPr sz="4113"/>
             </a:lvl6pPr>
-            <a:lvl7pPr marL="6266385" indent="0">
-              <a:buNone/>
-              <a:defRPr sz="4936"/>
+            <a:lvl7pPr marL="5221152" indent="0">
+              <a:buNone/>
+              <a:defRPr sz="4113"/>
             </a:lvl7pPr>
-            <a:lvl8pPr marL="7310790" indent="0">
-              <a:buNone/>
-              <a:defRPr sz="4936"/>
+            <a:lvl8pPr marL="6091350" indent="0">
+              <a:buNone/>
+              <a:defRPr sz="4113"/>
             </a:lvl8pPr>
-            <a:lvl9pPr marL="8355191" indent="0">
-              <a:buNone/>
-              <a:defRPr sz="4936"/>
+            <a:lvl9pPr marL="6961545" indent="0">
+              <a:buNone/>
+              <a:defRPr sz="4113"/>
             </a:lvl9pPr>
           </a:lstStyle>
           <a:p>
@@ -2875,8 +2875,8 @@
         </p:nvSpPr>
         <p:spPr>
           <a:xfrm>
-            <a:off x="1344220" y="2146944"/>
-            <a:ext cx="4114800" cy="321945"/>
+            <a:off x="1270164" y="1408933"/>
+            <a:ext cx="3888105" cy="211276"/>
           </a:xfrm>
         </p:spPr>
         <p:txBody>
@@ -2884,39 +2884,39 @@
           <a:lstStyle>
             <a:lvl1pPr marL="0" indent="0">
               <a:buNone/>
-              <a:defRPr sz="3084"/>
+              <a:defRPr sz="2570"/>
             </a:lvl1pPr>
-            <a:lvl2pPr marL="1044394" indent="0">
-              <a:buNone/>
-              <a:defRPr sz="2468"/>
+            <a:lvl2pPr marL="870189" indent="0">
+              <a:buNone/>
+              <a:defRPr sz="2056"/>
             </a:lvl2pPr>
-            <a:lvl3pPr marL="2088799" indent="0">
-              <a:buNone/>
-              <a:defRPr sz="1851"/>
+            <a:lvl3pPr marL="1740387" indent="0">
+              <a:buNone/>
+              <a:defRPr sz="1542"/>
             </a:lvl3pPr>
-            <a:lvl4pPr marL="3133193" indent="0">
-              <a:buNone/>
-              <a:defRPr sz="1851"/>
+            <a:lvl4pPr marL="2610576" indent="0">
+              <a:buNone/>
+              <a:defRPr sz="1542"/>
             </a:lvl4pPr>
-            <a:lvl5pPr marL="4177585" indent="0">
-              <a:buNone/>
-              <a:defRPr sz="1851"/>
+            <a:lvl5pPr marL="3480764" indent="0">
+              <a:buNone/>
+              <a:defRPr sz="1542"/>
             </a:lvl5pPr>
-            <a:lvl6pPr marL="5221993" indent="0">
-              <a:buNone/>
-              <a:defRPr sz="1851"/>
+            <a:lvl6pPr marL="4350965" indent="0">
+              <a:buNone/>
+              <a:defRPr sz="1542"/>
             </a:lvl6pPr>
-            <a:lvl7pPr marL="6266385" indent="0">
-              <a:buNone/>
-              <a:defRPr sz="1851"/>
+            <a:lvl7pPr marL="5221152" indent="0">
+              <a:buNone/>
+              <a:defRPr sz="1542"/>
             </a:lvl7pPr>
-            <a:lvl8pPr marL="7310790" indent="0">
-              <a:buNone/>
-              <a:defRPr sz="1851"/>
+            <a:lvl8pPr marL="6091350" indent="0">
+              <a:buNone/>
+              <a:defRPr sz="1542"/>
             </a:lvl8pPr>
-            <a:lvl9pPr marL="8355191" indent="0">
-              <a:buNone/>
-              <a:defRPr sz="1851"/>
+            <a:lvl9pPr marL="6961545" indent="0">
+              <a:buNone/>
+              <a:defRPr sz="1542"/>
             </a:lvl9pPr>
           </a:lstStyle>
           <a:p>
@@ -2945,7 +2945,7 @@
           <a:p>
             <a:fld id="{01197F44-DB72-474A-9754-31703E05C006}" type="datetimeFigureOut">
               <a:rPr lang="en-US" smtClean="0"/>
-              <a:t>9/19/22</a:t>
+              <a:t>9/7/23</a:t>
             </a:fld>
             <a:endParaRPr lang="en-US"/>
           </a:p>
@@ -3040,8 +3040,8 @@
         </p:nvSpPr>
         <p:spPr>
           <a:xfrm>
-            <a:off x="342909" y="109858"/>
-            <a:ext cx="6172202" cy="457200"/>
+            <a:off x="324019" y="72094"/>
+            <a:ext cx="5832159" cy="300038"/>
           </a:xfrm>
           <a:prstGeom prst="rect">
             <a:avLst/>
@@ -3072,8 +3072,8 @@
         </p:nvSpPr>
         <p:spPr>
           <a:xfrm>
-            <a:off x="342909" y="640093"/>
-            <a:ext cx="6172202" cy="1810385"/>
+            <a:off x="324019" y="420063"/>
+            <a:ext cx="5832159" cy="1188065"/>
           </a:xfrm>
           <a:prstGeom prst="rect">
             <a:avLst/>
@@ -3133,8 +3133,8 @@
         </p:nvSpPr>
         <p:spPr>
           <a:xfrm>
-            <a:off x="342900" y="2542549"/>
-            <a:ext cx="1600200" cy="146049"/>
+            <a:off x="324009" y="1668549"/>
+            <a:ext cx="1512042" cy="95845"/>
           </a:xfrm>
           <a:prstGeom prst="rect">
             <a:avLst/>
@@ -3144,7 +3144,7 @@
           <a:bodyPr vert="horz" lIns="67711" tIns="33854" rIns="67711" bIns="33854" rtlCol="0" anchor="ctr"/>
           <a:lstStyle>
             <a:lvl1pPr algn="l">
-              <a:defRPr sz="2468">
+              <a:defRPr sz="2056">
                 <a:solidFill>
                   <a:schemeClr val="tx1">
                     <a:tint val="75000"/>
@@ -3156,7 +3156,7 @@
           <a:p>
             <a:fld id="{01197F44-DB72-474A-9754-31703E05C006}" type="datetimeFigureOut">
               <a:rPr lang="en-US" smtClean="0"/>
-              <a:t>9/19/22</a:t>
+              <a:t>9/7/23</a:t>
             </a:fld>
             <a:endParaRPr lang="en-US"/>
           </a:p>
@@ -3174,8 +3174,8 @@
         </p:nvSpPr>
         <p:spPr>
           <a:xfrm>
-            <a:off x="2343153" y="2542549"/>
-            <a:ext cx="2171702" cy="146049"/>
+            <a:off x="2214063" y="1668549"/>
+            <a:ext cx="2052057" cy="95845"/>
           </a:xfrm>
           <a:prstGeom prst="rect">
             <a:avLst/>
@@ -3185,7 +3185,7 @@
           <a:bodyPr vert="horz" lIns="67711" tIns="33854" rIns="67711" bIns="33854" rtlCol="0" anchor="ctr"/>
           <a:lstStyle>
             <a:lvl1pPr algn="ctr">
-              <a:defRPr sz="2468">
+              <a:defRPr sz="2056">
                 <a:solidFill>
                   <a:schemeClr val="tx1">
                     <a:tint val="75000"/>
@@ -3211,8 +3211,8 @@
         </p:nvSpPr>
         <p:spPr>
           <a:xfrm>
-            <a:off x="4914900" y="2542549"/>
-            <a:ext cx="1600200" cy="146049"/>
+            <a:off x="4644126" y="1668549"/>
+            <a:ext cx="1512042" cy="95845"/>
           </a:xfrm>
           <a:prstGeom prst="rect">
             <a:avLst/>
@@ -3222,7 +3222,7 @@
           <a:bodyPr vert="horz" lIns="67711" tIns="33854" rIns="67711" bIns="33854" rtlCol="0" anchor="ctr"/>
           <a:lstStyle>
             <a:lvl1pPr algn="r">
-              <a:defRPr sz="2468">
+              <a:defRPr sz="2056">
                 <a:solidFill>
                   <a:schemeClr val="tx1">
                     <a:tint val="75000"/>
@@ -3263,12 +3263,12 @@
   </p:sldLayoutIdLst>
   <p:txStyles>
     <p:titleStyle>
-      <a:lvl1pPr algn="ctr" defTabSz="1044394" rtl="0" eaLnBrk="1" latinLnBrk="0" hangingPunct="1">
+      <a:lvl1pPr algn="ctr" defTabSz="870189" rtl="0" eaLnBrk="1" latinLnBrk="0" hangingPunct="1">
         <a:spcBef>
           <a:spcPct val="0"/>
         </a:spcBef>
         <a:buNone/>
-        <a:defRPr sz="9872" kern="1200">
+        <a:defRPr sz="8225" kern="1200">
           <a:solidFill>
             <a:schemeClr val="tx1"/>
           </a:solidFill>
@@ -3279,13 +3279,13 @@
       </a:lvl1pPr>
     </p:titleStyle>
     <p:bodyStyle>
-      <a:lvl1pPr marL="783295" indent="-783295" algn="l" defTabSz="1044394" rtl="0" eaLnBrk="1" latinLnBrk="0" hangingPunct="1">
+      <a:lvl1pPr marL="652641" indent="-652641" algn="l" defTabSz="870189" rtl="0" eaLnBrk="1" latinLnBrk="0" hangingPunct="1">
         <a:spcBef>
           <a:spcPct val="20000"/>
         </a:spcBef>
         <a:buFont typeface="Arial"/>
         <a:buChar char="•"/>
-        <a:defRPr sz="8022" kern="1200">
+        <a:defRPr sz="6684" kern="1200">
           <a:solidFill>
             <a:schemeClr val="tx1"/>
           </a:solidFill>
@@ -3294,13 +3294,13 @@
           <a:cs typeface="+mn-cs"/>
         </a:defRPr>
       </a:lvl1pPr>
-      <a:lvl2pPr marL="1697150" indent="-652744" algn="l" defTabSz="1044394" rtl="0" eaLnBrk="1" latinLnBrk="0" hangingPunct="1">
+      <a:lvl2pPr marL="1414065" indent="-543866" algn="l" defTabSz="870189" rtl="0" eaLnBrk="1" latinLnBrk="0" hangingPunct="1">
         <a:spcBef>
           <a:spcPct val="20000"/>
         </a:spcBef>
         <a:buFont typeface="Arial"/>
         <a:buChar char="–"/>
-        <a:defRPr sz="6787" kern="1200">
+        <a:defRPr sz="5655" kern="1200">
           <a:solidFill>
             <a:schemeClr val="tx1"/>
           </a:solidFill>
@@ -3309,13 +3309,13 @@
           <a:cs typeface="+mn-cs"/>
         </a:defRPr>
       </a:lvl2pPr>
-      <a:lvl3pPr marL="2610995" indent="-522190" algn="l" defTabSz="1044394" rtl="0" eaLnBrk="1" latinLnBrk="0" hangingPunct="1">
+      <a:lvl3pPr marL="2175481" indent="-435089" algn="l" defTabSz="870189" rtl="0" eaLnBrk="1" latinLnBrk="0" hangingPunct="1">
         <a:spcBef>
           <a:spcPct val="20000"/>
         </a:spcBef>
         <a:buFont typeface="Arial"/>
         <a:buChar char="•"/>
-        <a:defRPr sz="5553" kern="1200">
+        <a:defRPr sz="4627" kern="1200">
           <a:solidFill>
             <a:schemeClr val="tx1"/>
           </a:solidFill>
@@ -3324,13 +3324,13 @@
           <a:cs typeface="+mn-cs"/>
         </a:defRPr>
       </a:lvl3pPr>
-      <a:lvl4pPr marL="3655389" indent="-522190" algn="l" defTabSz="1044394" rtl="0" eaLnBrk="1" latinLnBrk="0" hangingPunct="1">
+      <a:lvl4pPr marL="3045670" indent="-435089" algn="l" defTabSz="870189" rtl="0" eaLnBrk="1" latinLnBrk="0" hangingPunct="1">
         <a:spcBef>
           <a:spcPct val="20000"/>
         </a:spcBef>
         <a:buFont typeface="Arial"/>
         <a:buChar char="–"/>
-        <a:defRPr sz="4936" kern="1200">
+        <a:defRPr sz="4113" kern="1200">
           <a:solidFill>
             <a:schemeClr val="tx1"/>
           </a:solidFill>
@@ -3339,13 +3339,13 @@
           <a:cs typeface="+mn-cs"/>
         </a:defRPr>
       </a:lvl4pPr>
-      <a:lvl5pPr marL="4699797" indent="-522190" algn="l" defTabSz="1044394" rtl="0" eaLnBrk="1" latinLnBrk="0" hangingPunct="1">
+      <a:lvl5pPr marL="3915871" indent="-435089" algn="l" defTabSz="870189" rtl="0" eaLnBrk="1" latinLnBrk="0" hangingPunct="1">
         <a:spcBef>
           <a:spcPct val="20000"/>
         </a:spcBef>
         <a:buFont typeface="Arial"/>
         <a:buChar char="»"/>
-        <a:defRPr sz="4936" kern="1200">
+        <a:defRPr sz="4113" kern="1200">
           <a:solidFill>
             <a:schemeClr val="tx1"/>
           </a:solidFill>
@@ -3354,13 +3354,13 @@
           <a:cs typeface="+mn-cs"/>
         </a:defRPr>
       </a:lvl5pPr>
-      <a:lvl6pPr marL="5744195" indent="-522190" algn="l" defTabSz="1044394" rtl="0" eaLnBrk="1" latinLnBrk="0" hangingPunct="1">
+      <a:lvl6pPr marL="4786063" indent="-435089" algn="l" defTabSz="870189" rtl="0" eaLnBrk="1" latinLnBrk="0" hangingPunct="1">
         <a:spcBef>
           <a:spcPct val="20000"/>
         </a:spcBef>
         <a:buFont typeface="Arial"/>
         <a:buChar char="•"/>
-        <a:defRPr sz="4936" kern="1200">
+        <a:defRPr sz="4113" kern="1200">
           <a:solidFill>
             <a:schemeClr val="tx1"/>
           </a:solidFill>
@@ -3369,13 +3369,13 @@
           <a:cs typeface="+mn-cs"/>
         </a:defRPr>
       </a:lvl6pPr>
-      <a:lvl7pPr marL="6788594" indent="-522190" algn="l" defTabSz="1044394" rtl="0" eaLnBrk="1" latinLnBrk="0" hangingPunct="1">
+      <a:lvl7pPr marL="5656257" indent="-435089" algn="l" defTabSz="870189" rtl="0" eaLnBrk="1" latinLnBrk="0" hangingPunct="1">
         <a:spcBef>
           <a:spcPct val="20000"/>
         </a:spcBef>
         <a:buFont typeface="Arial"/>
         <a:buChar char="•"/>
-        <a:defRPr sz="4936" kern="1200">
+        <a:defRPr sz="4113" kern="1200">
           <a:solidFill>
             <a:schemeClr val="tx1"/>
           </a:solidFill>
@@ -3384,13 +3384,13 @@
           <a:cs typeface="+mn-cs"/>
         </a:defRPr>
       </a:lvl7pPr>
-      <a:lvl8pPr marL="7832988" indent="-522190" algn="l" defTabSz="1044394" rtl="0" eaLnBrk="1" latinLnBrk="0" hangingPunct="1">
+      <a:lvl8pPr marL="6526446" indent="-435089" algn="l" defTabSz="870189" rtl="0" eaLnBrk="1" latinLnBrk="0" hangingPunct="1">
         <a:spcBef>
           <a:spcPct val="20000"/>
         </a:spcBef>
         <a:buFont typeface="Arial"/>
         <a:buChar char="•"/>
-        <a:defRPr sz="4936" kern="1200">
+        <a:defRPr sz="4113" kern="1200">
           <a:solidFill>
             <a:schemeClr val="tx1"/>
           </a:solidFill>
@@ -3399,13 +3399,13 @@
           <a:cs typeface="+mn-cs"/>
         </a:defRPr>
       </a:lvl8pPr>
-      <a:lvl9pPr marL="8877390" indent="-522190" algn="l" defTabSz="1044394" rtl="0" eaLnBrk="1" latinLnBrk="0" hangingPunct="1">
+      <a:lvl9pPr marL="7396641" indent="-435089" algn="l" defTabSz="870189" rtl="0" eaLnBrk="1" latinLnBrk="0" hangingPunct="1">
         <a:spcBef>
           <a:spcPct val="20000"/>
         </a:spcBef>
         <a:buFont typeface="Arial"/>
         <a:buChar char="•"/>
-        <a:defRPr sz="4936" kern="1200">
+        <a:defRPr sz="4113" kern="1200">
           <a:solidFill>
             <a:schemeClr val="tx1"/>
           </a:solidFill>
@@ -3419,8 +3419,8 @@
       <a:defPPr>
         <a:defRPr lang="en-US"/>
       </a:defPPr>
-      <a:lvl1pPr marL="0" algn="l" defTabSz="1044394" rtl="0" eaLnBrk="1" latinLnBrk="0" hangingPunct="1">
-        <a:defRPr sz="4318" kern="1200">
+      <a:lvl1pPr marL="0" algn="l" defTabSz="870189" rtl="0" eaLnBrk="1" latinLnBrk="0" hangingPunct="1">
+        <a:defRPr sz="3598" kern="1200">
           <a:solidFill>
             <a:schemeClr val="tx1"/>
           </a:solidFill>
@@ -3429,8 +3429,8 @@
           <a:cs typeface="+mn-cs"/>
         </a:defRPr>
       </a:lvl1pPr>
-      <a:lvl2pPr marL="1044394" algn="l" defTabSz="1044394" rtl="0" eaLnBrk="1" latinLnBrk="0" hangingPunct="1">
-        <a:defRPr sz="4318" kern="1200">
+      <a:lvl2pPr marL="870189" algn="l" defTabSz="870189" rtl="0" eaLnBrk="1" latinLnBrk="0" hangingPunct="1">
+        <a:defRPr sz="3598" kern="1200">
           <a:solidFill>
             <a:schemeClr val="tx1"/>
           </a:solidFill>
@@ -3439,8 +3439,8 @@
           <a:cs typeface="+mn-cs"/>
         </a:defRPr>
       </a:lvl2pPr>
-      <a:lvl3pPr marL="2088799" algn="l" defTabSz="1044394" rtl="0" eaLnBrk="1" latinLnBrk="0" hangingPunct="1">
-        <a:defRPr sz="4318" kern="1200">
+      <a:lvl3pPr marL="1740387" algn="l" defTabSz="870189" rtl="0" eaLnBrk="1" latinLnBrk="0" hangingPunct="1">
+        <a:defRPr sz="3598" kern="1200">
           <a:solidFill>
             <a:schemeClr val="tx1"/>
           </a:solidFill>
@@ -3449,8 +3449,8 @@
           <a:cs typeface="+mn-cs"/>
         </a:defRPr>
       </a:lvl3pPr>
-      <a:lvl4pPr marL="3133193" algn="l" defTabSz="1044394" rtl="0" eaLnBrk="1" latinLnBrk="0" hangingPunct="1">
-        <a:defRPr sz="4318" kern="1200">
+      <a:lvl4pPr marL="2610576" algn="l" defTabSz="870189" rtl="0" eaLnBrk="1" latinLnBrk="0" hangingPunct="1">
+        <a:defRPr sz="3598" kern="1200">
           <a:solidFill>
             <a:schemeClr val="tx1"/>
           </a:solidFill>
@@ -3459,8 +3459,8 @@
           <a:cs typeface="+mn-cs"/>
         </a:defRPr>
       </a:lvl4pPr>
-      <a:lvl5pPr marL="4177585" algn="l" defTabSz="1044394" rtl="0" eaLnBrk="1" latinLnBrk="0" hangingPunct="1">
-        <a:defRPr sz="4318" kern="1200">
+      <a:lvl5pPr marL="3480764" algn="l" defTabSz="870189" rtl="0" eaLnBrk="1" latinLnBrk="0" hangingPunct="1">
+        <a:defRPr sz="3598" kern="1200">
           <a:solidFill>
             <a:schemeClr val="tx1"/>
           </a:solidFill>
@@ -3469,8 +3469,8 @@
           <a:cs typeface="+mn-cs"/>
         </a:defRPr>
       </a:lvl5pPr>
-      <a:lvl6pPr marL="5221993" algn="l" defTabSz="1044394" rtl="0" eaLnBrk="1" latinLnBrk="0" hangingPunct="1">
-        <a:defRPr sz="4318" kern="1200">
+      <a:lvl6pPr marL="4350965" algn="l" defTabSz="870189" rtl="0" eaLnBrk="1" latinLnBrk="0" hangingPunct="1">
+        <a:defRPr sz="3598" kern="1200">
           <a:solidFill>
             <a:schemeClr val="tx1"/>
           </a:solidFill>
@@ -3479,8 +3479,8 @@
           <a:cs typeface="+mn-cs"/>
         </a:defRPr>
       </a:lvl6pPr>
-      <a:lvl7pPr marL="6266385" algn="l" defTabSz="1044394" rtl="0" eaLnBrk="1" latinLnBrk="0" hangingPunct="1">
-        <a:defRPr sz="4318" kern="1200">
+      <a:lvl7pPr marL="5221152" algn="l" defTabSz="870189" rtl="0" eaLnBrk="1" latinLnBrk="0" hangingPunct="1">
+        <a:defRPr sz="3598" kern="1200">
           <a:solidFill>
             <a:schemeClr val="tx1"/>
           </a:solidFill>
@@ -3489,8 +3489,8 @@
           <a:cs typeface="+mn-cs"/>
         </a:defRPr>
       </a:lvl7pPr>
-      <a:lvl8pPr marL="7310790" algn="l" defTabSz="1044394" rtl="0" eaLnBrk="1" latinLnBrk="0" hangingPunct="1">
-        <a:defRPr sz="4318" kern="1200">
+      <a:lvl8pPr marL="6091350" algn="l" defTabSz="870189" rtl="0" eaLnBrk="1" latinLnBrk="0" hangingPunct="1">
+        <a:defRPr sz="3598" kern="1200">
           <a:solidFill>
             <a:schemeClr val="tx1"/>
           </a:solidFill>
@@ -3499,8 +3499,8 @@
           <a:cs typeface="+mn-cs"/>
         </a:defRPr>
       </a:lvl8pPr>
-      <a:lvl9pPr marL="8355191" algn="l" defTabSz="1044394" rtl="0" eaLnBrk="1" latinLnBrk="0" hangingPunct="1">
-        <a:defRPr sz="4318" kern="1200">
+      <a:lvl9pPr marL="6961545" algn="l" defTabSz="870189" rtl="0" eaLnBrk="1" latinLnBrk="0" hangingPunct="1">
+        <a:defRPr sz="3598" kern="1200">
           <a:solidFill>
             <a:schemeClr val="tx1"/>
           </a:solidFill>
@@ -3531,82 +3531,12 @@
           <a:chExt cx="0" cy="0"/>
         </a:xfrm>
       </p:grpSpPr>
-      <p:sp>
-        <p:nvSpPr>
-          <p:cNvPr id="23" name="TextBox 22">
+      <p:pic>
+        <p:nvPicPr>
+          <p:cNvPr id="10" name="Picture 9">
             <a:extLst>
               <a:ext uri="{FF2B5EF4-FFF2-40B4-BE49-F238E27FC236}">
-                <a16:creationId xmlns:a16="http://schemas.microsoft.com/office/drawing/2014/main" id="{2FAF6053-80F7-364D-8E46-68F538A8202C}"/>
-              </a:ext>
-            </a:extLst>
-          </p:cNvPr>
-          <p:cNvSpPr txBox="1"/>
-          <p:nvPr/>
-        </p:nvSpPr>
-        <p:spPr>
-          <a:xfrm>
-            <a:off x="-66497" y="-118883"/>
-            <a:ext cx="589590" cy="461665"/>
-          </a:xfrm>
-          <a:prstGeom prst="rect">
-            <a:avLst/>
-          </a:prstGeom>
-          <a:noFill/>
-        </p:spPr>
-        <p:txBody>
-          <a:bodyPr wrap="square" rtlCol="0">
-            <a:spAutoFit/>
-          </a:bodyPr>
-          <a:lstStyle/>
-          <a:p>
-            <a:r>
-              <a:rPr lang="en-US" sz="2400" b="1" dirty="0"/>
-              <a:t>A</a:t>
-            </a:r>
-          </a:p>
-        </p:txBody>
-      </p:sp>
-      <p:sp>
-        <p:nvSpPr>
-          <p:cNvPr id="24" name="TextBox 23">
-            <a:extLst>
-              <a:ext uri="{FF2B5EF4-FFF2-40B4-BE49-F238E27FC236}">
-                <a16:creationId xmlns:a16="http://schemas.microsoft.com/office/drawing/2014/main" id="{3B67E9E2-6C7A-3D4E-854E-3316B8747EA7}"/>
-              </a:ext>
-            </a:extLst>
-          </p:cNvPr>
-          <p:cNvSpPr txBox="1"/>
-          <p:nvPr/>
-        </p:nvSpPr>
-        <p:spPr>
-          <a:xfrm>
-            <a:off x="3688111" y="-86657"/>
-            <a:ext cx="805912" cy="523220"/>
-          </a:xfrm>
-          <a:prstGeom prst="rect">
-            <a:avLst/>
-          </a:prstGeom>
-          <a:noFill/>
-        </p:spPr>
-        <p:txBody>
-          <a:bodyPr wrap="square" rtlCol="0">
-            <a:spAutoFit/>
-          </a:bodyPr>
-          <a:lstStyle/>
-          <a:p>
-            <a:r>
-              <a:rPr lang="en-US" sz="2800" b="1" dirty="0"/>
-              <a:t>B</a:t>
-            </a:r>
-          </a:p>
-        </p:txBody>
-      </p:sp>
-      <p:pic>
-        <p:nvPicPr>
-          <p:cNvPr id="3" name="Picture 2">
-            <a:extLst>
-              <a:ext uri="{FF2B5EF4-FFF2-40B4-BE49-F238E27FC236}">
-                <a16:creationId xmlns:a16="http://schemas.microsoft.com/office/drawing/2014/main" id="{A2578E72-FC41-4E45-9D96-50A399E69815}"/>
+                <a16:creationId xmlns:a16="http://schemas.microsoft.com/office/drawing/2014/main" id="{DCBE7FC6-1265-2948-B7DA-328A1900A1F8}"/>
               </a:ext>
             </a:extLst>
           </p:cNvPr>
@@ -3623,38 +3553,8 @@
         </p:blipFill>
         <p:spPr>
           <a:xfrm>
-            <a:off x="136366" y="0"/>
-            <a:ext cx="2927667" cy="2743200"/>
-          </a:xfrm>
-          <a:prstGeom prst="rect">
-            <a:avLst/>
-          </a:prstGeom>
-        </p:spPr>
-      </p:pic>
-      <p:pic>
-        <p:nvPicPr>
-          <p:cNvPr id="5" name="Picture 4">
-            <a:extLst>
-              <a:ext uri="{FF2B5EF4-FFF2-40B4-BE49-F238E27FC236}">
-                <a16:creationId xmlns:a16="http://schemas.microsoft.com/office/drawing/2014/main" id="{EF731DC9-9A05-124E-995A-6491A3E02A7F}"/>
-              </a:ext>
-            </a:extLst>
-          </p:cNvPr>
-          <p:cNvPicPr>
-            <a:picLocks noChangeAspect="1"/>
-          </p:cNvPicPr>
-          <p:nvPr/>
-        </p:nvPicPr>
-        <p:blipFill>
-          <a:blip r:embed="rId4"/>
-          <a:stretch>
-            <a:fillRect/>
-          </a:stretch>
-        </p:blipFill>
-        <p:spPr>
-          <a:xfrm>
-            <a:off x="3978434" y="0"/>
-            <a:ext cx="2743200" cy="2743200"/>
+            <a:off x="86931" y="0"/>
+            <a:ext cx="6306311" cy="1801803"/>
           </a:xfrm>
           <a:prstGeom prst="rect">
             <a:avLst/>

</xml_diff>